<commit_message>
create : 글쓰기 폼 UI 제작
</commit_message>
<xml_diff>
--- a/GHAS_bulletinBoard/프로토타입.pptx
+++ b/GHAS_bulletinBoard/프로토타입.pptx
@@ -6,6 +6,7 @@
   </p:sldMasterIdLst>
   <p:sldIdLst>
     <p:sldId id="256" r:id="rId2"/>
+    <p:sldId id="257" r:id="rId3"/>
   </p:sldIdLst>
   <p:sldSz cx="12192000" cy="6858000"/>
   <p:notesSz cx="6858000" cy="9144000"/>
@@ -104,6 +105,11 @@
       </a:defRPr>
     </a:lvl9pPr>
   </p:defaultTextStyle>
+  <p:extLst>
+    <p:ext uri="{EFAFB233-063F-42B5-8137-9DF3F51BA10A}">
+      <p15:sldGuideLst xmlns:p15="http://schemas.microsoft.com/office/powerpoint/2012/main"/>
+    </p:ext>
+  </p:extLst>
 </p:presentation>
 </file>
 
@@ -3646,6 +3652,608 @@
 </p:sld>
 </file>
 
+<file path=ppt/slides/slide2.xml><?xml version="1.0" encoding="utf-8"?>
+<p:sld xmlns:a="http://schemas.openxmlformats.org/drawingml/2006/main" xmlns:r="http://schemas.openxmlformats.org/officeDocument/2006/relationships" xmlns:p="http://schemas.openxmlformats.org/presentationml/2006/main">
+  <p:cSld>
+    <p:spTree>
+      <p:nvGrpSpPr>
+        <p:cNvPr id="1" name=""/>
+        <p:cNvGrpSpPr/>
+        <p:nvPr/>
+      </p:nvGrpSpPr>
+      <p:grpSpPr>
+        <a:xfrm>
+          <a:off x="0" y="0"/>
+          <a:ext cx="0" cy="0"/>
+          <a:chOff x="0" y="0"/>
+          <a:chExt cx="0" cy="0"/>
+        </a:xfrm>
+      </p:grpSpPr>
+      <p:sp>
+        <p:nvSpPr>
+          <p:cNvPr id="4" name="TextBox 3"/>
+          <p:cNvSpPr txBox="1"/>
+          <p:nvPr/>
+        </p:nvSpPr>
+        <p:spPr>
+          <a:xfrm>
+            <a:off x="159026" y="270344"/>
+            <a:ext cx="1181734" cy="369332"/>
+          </a:xfrm>
+          <a:prstGeom prst="rect">
+            <a:avLst/>
+          </a:prstGeom>
+          <a:noFill/>
+        </p:spPr>
+        <p:txBody>
+          <a:bodyPr wrap="none" rtlCol="0">
+            <a:spAutoFit/>
+          </a:bodyPr>
+          <a:lstStyle/>
+          <a:p>
+            <a:r>
+              <a:rPr lang="en-US" altLang="ko-KR" dirty="0" smtClean="0"/>
+              <a:t>Writing</a:t>
+            </a:r>
+            <a:r>
+              <a:rPr lang="ko-KR" altLang="en-US" dirty="0" smtClean="0"/>
+              <a:t>폼</a:t>
+            </a:r>
+            <a:endParaRPr lang="ko-KR" altLang="en-US" dirty="0"/>
+          </a:p>
+        </p:txBody>
+      </p:sp>
+      <p:sp>
+        <p:nvSpPr>
+          <p:cNvPr id="5" name="직사각형 4"/>
+          <p:cNvSpPr/>
+          <p:nvPr/>
+        </p:nvSpPr>
+        <p:spPr>
+          <a:xfrm>
+            <a:off x="333955" y="834886"/>
+            <a:ext cx="4468633" cy="5406887"/>
+          </a:xfrm>
+          <a:prstGeom prst="rect">
+            <a:avLst/>
+          </a:prstGeom>
+        </p:spPr>
+        <p:style>
+          <a:lnRef idx="2">
+            <a:schemeClr val="dk1"/>
+          </a:lnRef>
+          <a:fillRef idx="1">
+            <a:schemeClr val="lt1"/>
+          </a:fillRef>
+          <a:effectRef idx="0">
+            <a:schemeClr val="dk1"/>
+          </a:effectRef>
+          <a:fontRef idx="minor">
+            <a:schemeClr val="dk1"/>
+          </a:fontRef>
+        </p:style>
+        <p:txBody>
+          <a:bodyPr rtlCol="0" anchor="ctr"/>
+          <a:lstStyle/>
+          <a:p>
+            <a:pPr algn="ctr"/>
+            <a:endParaRPr lang="ko-KR" altLang="en-US"/>
+          </a:p>
+        </p:txBody>
+      </p:sp>
+      <p:sp>
+        <p:nvSpPr>
+          <p:cNvPr id="7" name="직사각형 6"/>
+          <p:cNvSpPr/>
+          <p:nvPr/>
+        </p:nvSpPr>
+        <p:spPr>
+          <a:xfrm>
+            <a:off x="489668" y="2320866"/>
+            <a:ext cx="4157206" cy="3090378"/>
+          </a:xfrm>
+          <a:prstGeom prst="rect">
+            <a:avLst/>
+          </a:prstGeom>
+        </p:spPr>
+        <p:style>
+          <a:lnRef idx="2">
+            <a:schemeClr val="dk1">
+              <a:shade val="50000"/>
+            </a:schemeClr>
+          </a:lnRef>
+          <a:fillRef idx="1">
+            <a:schemeClr val="dk1"/>
+          </a:fillRef>
+          <a:effectRef idx="0">
+            <a:schemeClr val="dk1"/>
+          </a:effectRef>
+          <a:fontRef idx="minor">
+            <a:schemeClr val="lt1"/>
+          </a:fontRef>
+        </p:style>
+        <p:txBody>
+          <a:bodyPr rtlCol="0" anchor="ctr"/>
+          <a:lstStyle/>
+          <a:p>
+            <a:pPr algn="ctr"/>
+            <a:r>
+              <a:rPr lang="ko-KR" altLang="en-US" dirty="0" smtClean="0"/>
+              <a:t>내용</a:t>
+            </a:r>
+            <a:endParaRPr lang="ko-KR" altLang="en-US" dirty="0"/>
+          </a:p>
+        </p:txBody>
+      </p:sp>
+      <p:sp>
+        <p:nvSpPr>
+          <p:cNvPr id="8" name="직사각형 7"/>
+          <p:cNvSpPr/>
+          <p:nvPr/>
+        </p:nvSpPr>
+        <p:spPr>
+          <a:xfrm>
+            <a:off x="489668" y="1698333"/>
+            <a:ext cx="4157206" cy="427323"/>
+          </a:xfrm>
+          <a:prstGeom prst="rect">
+            <a:avLst/>
+          </a:prstGeom>
+        </p:spPr>
+        <p:style>
+          <a:lnRef idx="2">
+            <a:schemeClr val="dk1">
+              <a:shade val="50000"/>
+            </a:schemeClr>
+          </a:lnRef>
+          <a:fillRef idx="1">
+            <a:schemeClr val="dk1"/>
+          </a:fillRef>
+          <a:effectRef idx="0">
+            <a:schemeClr val="dk1"/>
+          </a:effectRef>
+          <a:fontRef idx="minor">
+            <a:schemeClr val="lt1"/>
+          </a:fontRef>
+        </p:style>
+        <p:txBody>
+          <a:bodyPr rtlCol="0" anchor="ctr"/>
+          <a:lstStyle/>
+          <a:p>
+            <a:pPr algn="ctr"/>
+            <a:r>
+              <a:rPr lang="ko-KR" altLang="en-US" dirty="0" smtClean="0"/>
+              <a:t>작성자</a:t>
+            </a:r>
+            <a:r>
+              <a:rPr lang="en-US" altLang="ko-KR" dirty="0"/>
+              <a:t> </a:t>
+            </a:r>
+            <a:r>
+              <a:rPr lang="en-US" altLang="ko-KR" dirty="0" smtClean="0"/>
+              <a:t>                              </a:t>
+            </a:r>
+            <a:r>
+              <a:rPr lang="ko-KR" altLang="en-US" dirty="0" smtClean="0"/>
+              <a:t>날짜           </a:t>
+            </a:r>
+            <a:endParaRPr lang="ko-KR" altLang="en-US" dirty="0"/>
+          </a:p>
+        </p:txBody>
+      </p:sp>
+      <p:sp>
+        <p:nvSpPr>
+          <p:cNvPr id="19" name="직사각형 18"/>
+          <p:cNvSpPr/>
+          <p:nvPr/>
+        </p:nvSpPr>
+        <p:spPr>
+          <a:xfrm>
+            <a:off x="489668" y="1084804"/>
+            <a:ext cx="4157206" cy="418319"/>
+          </a:xfrm>
+          <a:prstGeom prst="rect">
+            <a:avLst/>
+          </a:prstGeom>
+        </p:spPr>
+        <p:style>
+          <a:lnRef idx="2">
+            <a:schemeClr val="dk1">
+              <a:shade val="50000"/>
+            </a:schemeClr>
+          </a:lnRef>
+          <a:fillRef idx="1">
+            <a:schemeClr val="dk1"/>
+          </a:fillRef>
+          <a:effectRef idx="0">
+            <a:schemeClr val="dk1"/>
+          </a:effectRef>
+          <a:fontRef idx="minor">
+            <a:schemeClr val="lt1"/>
+          </a:fontRef>
+        </p:style>
+        <p:txBody>
+          <a:bodyPr rtlCol="0" anchor="ctr"/>
+          <a:lstStyle/>
+          <a:p>
+            <a:pPr algn="ctr"/>
+            <a:r>
+              <a:rPr lang="ko-KR" altLang="en-US" dirty="0" smtClean="0"/>
+              <a:t>제목</a:t>
+            </a:r>
+            <a:endParaRPr lang="ko-KR" altLang="en-US" dirty="0"/>
+          </a:p>
+        </p:txBody>
+      </p:sp>
+      <p:sp>
+        <p:nvSpPr>
+          <p:cNvPr id="20" name="직사각형 19"/>
+          <p:cNvSpPr/>
+          <p:nvPr/>
+        </p:nvSpPr>
+        <p:spPr>
+          <a:xfrm>
+            <a:off x="3097170" y="5606454"/>
+            <a:ext cx="1549704" cy="393513"/>
+          </a:xfrm>
+          <a:prstGeom prst="rect">
+            <a:avLst/>
+          </a:prstGeom>
+        </p:spPr>
+        <p:style>
+          <a:lnRef idx="2">
+            <a:schemeClr val="dk1">
+              <a:shade val="50000"/>
+            </a:schemeClr>
+          </a:lnRef>
+          <a:fillRef idx="1">
+            <a:schemeClr val="dk1"/>
+          </a:fillRef>
+          <a:effectRef idx="0">
+            <a:schemeClr val="dk1"/>
+          </a:effectRef>
+          <a:fontRef idx="minor">
+            <a:schemeClr val="lt1"/>
+          </a:fontRef>
+        </p:style>
+        <p:txBody>
+          <a:bodyPr rtlCol="0" anchor="ctr"/>
+          <a:lstStyle/>
+          <a:p>
+            <a:pPr algn="ctr"/>
+            <a:r>
+              <a:rPr lang="ko-KR" altLang="en-US" dirty="0" smtClean="0"/>
+              <a:t>저장</a:t>
+            </a:r>
+            <a:endParaRPr lang="ko-KR" altLang="en-US" dirty="0"/>
+          </a:p>
+        </p:txBody>
+      </p:sp>
+      <p:sp>
+        <p:nvSpPr>
+          <p:cNvPr id="3" name="TextBox 2"/>
+          <p:cNvSpPr txBox="1"/>
+          <p:nvPr/>
+        </p:nvSpPr>
+        <p:spPr>
+          <a:xfrm>
+            <a:off x="6162805" y="900138"/>
+            <a:ext cx="3251211" cy="369332"/>
+          </a:xfrm>
+          <a:prstGeom prst="rect">
+            <a:avLst/>
+          </a:prstGeom>
+          <a:noFill/>
+        </p:spPr>
+        <p:txBody>
+          <a:bodyPr wrap="none" rtlCol="0">
+            <a:spAutoFit/>
+          </a:bodyPr>
+          <a:lstStyle/>
+          <a:p>
+            <a:r>
+              <a:rPr lang="ko-KR" altLang="en-US" dirty="0" smtClean="0"/>
+              <a:t>텍스트 필드로 제목을 받는다</a:t>
+            </a:r>
+            <a:r>
+              <a:rPr lang="en-US" altLang="ko-KR" dirty="0" smtClean="0"/>
+              <a:t>.</a:t>
+            </a:r>
+            <a:endParaRPr lang="ko-KR" altLang="en-US" dirty="0"/>
+          </a:p>
+        </p:txBody>
+      </p:sp>
+      <p:cxnSp>
+        <p:nvCxnSpPr>
+          <p:cNvPr id="11" name="직선 화살표 연결선 10"/>
+          <p:cNvCxnSpPr>
+            <a:stCxn id="19" idx="3"/>
+            <a:endCxn id="3" idx="1"/>
+          </p:cNvCxnSpPr>
+          <p:nvPr/>
+        </p:nvCxnSpPr>
+        <p:spPr>
+          <a:xfrm flipV="1">
+            <a:off x="4646874" y="1084804"/>
+            <a:ext cx="1515931" cy="209160"/>
+          </a:xfrm>
+          <a:prstGeom prst="straightConnector1">
+            <a:avLst/>
+          </a:prstGeom>
+          <a:ln>
+            <a:tailEnd type="triangle"/>
+          </a:ln>
+        </p:spPr>
+        <p:style>
+          <a:lnRef idx="1">
+            <a:schemeClr val="accent1"/>
+          </a:lnRef>
+          <a:fillRef idx="0">
+            <a:schemeClr val="accent1"/>
+          </a:fillRef>
+          <a:effectRef idx="0">
+            <a:schemeClr val="accent1"/>
+          </a:effectRef>
+          <a:fontRef idx="minor">
+            <a:schemeClr val="tx1"/>
+          </a:fontRef>
+        </p:style>
+      </p:cxnSp>
+      <p:sp>
+        <p:nvSpPr>
+          <p:cNvPr id="14" name="TextBox 13"/>
+          <p:cNvSpPr txBox="1"/>
+          <p:nvPr/>
+        </p:nvSpPr>
+        <p:spPr>
+          <a:xfrm>
+            <a:off x="6162805" y="1543882"/>
+            <a:ext cx="5343129" cy="646331"/>
+          </a:xfrm>
+          <a:prstGeom prst="rect">
+            <a:avLst/>
+          </a:prstGeom>
+          <a:noFill/>
+        </p:spPr>
+        <p:txBody>
+          <a:bodyPr wrap="none" rtlCol="0">
+            <a:spAutoFit/>
+          </a:bodyPr>
+          <a:lstStyle/>
+          <a:p>
+            <a:r>
+              <a:rPr lang="ko-KR" altLang="en-US" dirty="0" smtClean="0"/>
+              <a:t>작성자는 로그인한 값에 따라 자동으로 채워지며</a:t>
+            </a:r>
+            <a:r>
+              <a:rPr lang="en-US" altLang="ko-KR" dirty="0" smtClean="0"/>
+              <a:t>, </a:t>
+            </a:r>
+          </a:p>
+          <a:p>
+            <a:r>
+              <a:rPr lang="ko-KR" altLang="en-US" dirty="0" smtClean="0"/>
+              <a:t>날짜는 </a:t>
+            </a:r>
+            <a:r>
+              <a:rPr lang="en-US" altLang="ko-KR" dirty="0" err="1" smtClean="0"/>
+              <a:t>JDatePicker</a:t>
+            </a:r>
+            <a:r>
+              <a:rPr lang="ko-KR" altLang="en-US" dirty="0" smtClean="0"/>
+              <a:t>를 사용하여 받아온다</a:t>
+            </a:r>
+            <a:r>
+              <a:rPr lang="en-US" altLang="ko-KR" dirty="0" smtClean="0"/>
+              <a:t>.</a:t>
+            </a:r>
+            <a:endParaRPr lang="ko-KR" altLang="en-US" dirty="0"/>
+          </a:p>
+        </p:txBody>
+      </p:sp>
+      <p:cxnSp>
+        <p:nvCxnSpPr>
+          <p:cNvPr id="21" name="직선 화살표 연결선 20"/>
+          <p:cNvCxnSpPr>
+            <a:endCxn id="14" idx="1"/>
+          </p:cNvCxnSpPr>
+          <p:nvPr/>
+        </p:nvCxnSpPr>
+        <p:spPr>
+          <a:xfrm flipV="1">
+            <a:off x="4646874" y="1867048"/>
+            <a:ext cx="1515931" cy="44946"/>
+          </a:xfrm>
+          <a:prstGeom prst="straightConnector1">
+            <a:avLst/>
+          </a:prstGeom>
+          <a:ln>
+            <a:tailEnd type="triangle"/>
+          </a:ln>
+        </p:spPr>
+        <p:style>
+          <a:lnRef idx="1">
+            <a:schemeClr val="accent1"/>
+          </a:lnRef>
+          <a:fillRef idx="0">
+            <a:schemeClr val="accent1"/>
+          </a:fillRef>
+          <a:effectRef idx="0">
+            <a:schemeClr val="accent1"/>
+          </a:effectRef>
+          <a:fontRef idx="minor">
+            <a:schemeClr val="tx1"/>
+          </a:fontRef>
+        </p:style>
+      </p:cxnSp>
+      <p:sp>
+        <p:nvSpPr>
+          <p:cNvPr id="24" name="TextBox 23"/>
+          <p:cNvSpPr txBox="1"/>
+          <p:nvPr/>
+        </p:nvSpPr>
+        <p:spPr>
+          <a:xfrm>
+            <a:off x="6162805" y="2578631"/>
+            <a:ext cx="3020379" cy="369332"/>
+          </a:xfrm>
+          <a:prstGeom prst="rect">
+            <a:avLst/>
+          </a:prstGeom>
+          <a:noFill/>
+        </p:spPr>
+        <p:txBody>
+          <a:bodyPr wrap="none" rtlCol="0">
+            <a:spAutoFit/>
+          </a:bodyPr>
+          <a:lstStyle/>
+          <a:p>
+            <a:r>
+              <a:rPr lang="ko-KR" altLang="en-US" dirty="0" smtClean="0"/>
+              <a:t>텍스트 필드로 값을 받는다</a:t>
+            </a:r>
+            <a:r>
+              <a:rPr lang="en-US" altLang="ko-KR" dirty="0" smtClean="0"/>
+              <a:t>.</a:t>
+            </a:r>
+            <a:endParaRPr lang="ko-KR" altLang="en-US" dirty="0"/>
+          </a:p>
+        </p:txBody>
+      </p:sp>
+      <p:cxnSp>
+        <p:nvCxnSpPr>
+          <p:cNvPr id="27" name="직선 화살표 연결선 26"/>
+          <p:cNvCxnSpPr>
+            <a:endCxn id="24" idx="1"/>
+          </p:cNvCxnSpPr>
+          <p:nvPr/>
+        </p:nvCxnSpPr>
+        <p:spPr>
+          <a:xfrm flipV="1">
+            <a:off x="4646874" y="2763297"/>
+            <a:ext cx="1515931" cy="1128920"/>
+          </a:xfrm>
+          <a:prstGeom prst="straightConnector1">
+            <a:avLst/>
+          </a:prstGeom>
+          <a:ln>
+            <a:tailEnd type="triangle"/>
+          </a:ln>
+        </p:spPr>
+        <p:style>
+          <a:lnRef idx="1">
+            <a:schemeClr val="accent1"/>
+          </a:lnRef>
+          <a:fillRef idx="0">
+            <a:schemeClr val="accent1"/>
+          </a:fillRef>
+          <a:effectRef idx="0">
+            <a:schemeClr val="accent1"/>
+          </a:effectRef>
+          <a:fontRef idx="minor">
+            <a:schemeClr val="tx1"/>
+          </a:fontRef>
+        </p:style>
+      </p:cxnSp>
+      <p:sp>
+        <p:nvSpPr>
+          <p:cNvPr id="31" name="TextBox 30"/>
+          <p:cNvSpPr txBox="1"/>
+          <p:nvPr/>
+        </p:nvSpPr>
+        <p:spPr>
+          <a:xfrm>
+            <a:off x="6162805" y="5585061"/>
+            <a:ext cx="4153701" cy="369332"/>
+          </a:xfrm>
+          <a:prstGeom prst="rect">
+            <a:avLst/>
+          </a:prstGeom>
+          <a:noFill/>
+        </p:spPr>
+        <p:txBody>
+          <a:bodyPr wrap="none" rtlCol="0">
+            <a:spAutoFit/>
+          </a:bodyPr>
+          <a:lstStyle/>
+          <a:p>
+            <a:r>
+              <a:rPr lang="ko-KR" altLang="en-US" dirty="0" smtClean="0"/>
+              <a:t>저장 시 </a:t>
+            </a:r>
+            <a:r>
+              <a:rPr lang="en-US" altLang="ko-KR" dirty="0" err="1" smtClean="0"/>
+              <a:t>db</a:t>
+            </a:r>
+            <a:r>
+              <a:rPr lang="ko-KR" altLang="en-US" dirty="0" smtClean="0"/>
+              <a:t>에 저장되며 </a:t>
+            </a:r>
+            <a:r>
+              <a:rPr lang="ko-KR" altLang="en-US" dirty="0" err="1" smtClean="0"/>
+              <a:t>메인에</a:t>
+            </a:r>
+            <a:r>
+              <a:rPr lang="ko-KR" altLang="en-US" dirty="0" smtClean="0"/>
+              <a:t> 보인다</a:t>
+            </a:r>
+            <a:r>
+              <a:rPr lang="en-US" altLang="ko-KR" dirty="0" smtClean="0"/>
+              <a:t>.</a:t>
+            </a:r>
+            <a:endParaRPr lang="ko-KR" altLang="en-US" dirty="0"/>
+          </a:p>
+        </p:txBody>
+      </p:sp>
+      <p:cxnSp>
+        <p:nvCxnSpPr>
+          <p:cNvPr id="35" name="직선 화살표 연결선 34"/>
+          <p:cNvCxnSpPr>
+            <a:stCxn id="20" idx="3"/>
+            <a:endCxn id="31" idx="1"/>
+          </p:cNvCxnSpPr>
+          <p:nvPr/>
+        </p:nvCxnSpPr>
+        <p:spPr>
+          <a:xfrm flipV="1">
+            <a:off x="4646874" y="5769727"/>
+            <a:ext cx="1515931" cy="33484"/>
+          </a:xfrm>
+          <a:prstGeom prst="straightConnector1">
+            <a:avLst/>
+          </a:prstGeom>
+          <a:ln>
+            <a:tailEnd type="triangle"/>
+          </a:ln>
+        </p:spPr>
+        <p:style>
+          <a:lnRef idx="1">
+            <a:schemeClr val="accent1"/>
+          </a:lnRef>
+          <a:fillRef idx="0">
+            <a:schemeClr val="accent1"/>
+          </a:fillRef>
+          <a:effectRef idx="0">
+            <a:schemeClr val="accent1"/>
+          </a:effectRef>
+          <a:fontRef idx="minor">
+            <a:schemeClr val="tx1"/>
+          </a:fontRef>
+        </p:style>
+      </p:cxnSp>
+    </p:spTree>
+    <p:extLst>
+      <p:ext uri="{BB962C8B-B14F-4D97-AF65-F5344CB8AC3E}">
+        <p14:creationId xmlns:p14="http://schemas.microsoft.com/office/powerpoint/2010/main" val="1104519932"/>
+      </p:ext>
+    </p:extLst>
+  </p:cSld>
+  <p:clrMapOvr>
+    <a:masterClrMapping/>
+  </p:clrMapOvr>
+</p:sld>
+</file>
+
 <file path=ppt/theme/theme1.xml><?xml version="1.0" encoding="utf-8"?>
 <a:theme xmlns:a="http://schemas.openxmlformats.org/drawingml/2006/main" name="Office 테마">
   <a:themeElements>

</xml_diff>